<commit_message>
Added API key to pdf and pptx
</commit_message>
<xml_diff>
--- a/FaultDetection.pptx
+++ b/FaultDetection.pptx
@@ -4467,6 +4467,18 @@
             </a:r>
             <a:endParaRPr lang="en-IN" dirty="0"/>
           </a:p>
+          <a:p>
+            <a:pPr marL="629920" lvl="1" indent="-305435"/>
+            <a:r>
+              <a:rPr lang="en-IN" dirty="0"/>
+              <a:t>API Key: </a:t>
+            </a:r>
+            <a:r>
+              <a:rPr lang="en-US"/>
+              <a:t>pfcv1TZzZcD3E066ohHuRwHhu_DZwamQV6FcJnL3okBV</a:t>
+            </a:r>
+            <a:endParaRPr lang="en-IN" dirty="0"/>
+          </a:p>
         </p:txBody>
       </p:sp>
       <p:pic>
@@ -4491,8 +4503,8 @@
         </p:blipFill>
         <p:spPr>
           <a:xfrm>
-            <a:off x="2328529" y="2647576"/>
-            <a:ext cx="7534940" cy="3508268"/>
+            <a:off x="2328529" y="3017213"/>
+            <a:ext cx="6741043" cy="3138630"/>
           </a:xfrm>
           <a:prstGeom prst="rect">
             <a:avLst/>

</xml_diff>